<commit_message>
added ui slides at end
</commit_message>
<xml_diff>
--- a/Equinox_Presentation.pptx
+++ b/Equinox_Presentation.pptx
@@ -13,6 +13,11 @@
     <p:sldId id="261" r:id="rId7"/>
     <p:sldId id="262" r:id="rId8"/>
     <p:sldId id="263" r:id="rId9"/>
+    <p:sldId id="268" r:id="rId10"/>
+    <p:sldId id="264" r:id="rId11"/>
+    <p:sldId id="265" r:id="rId12"/>
+    <p:sldId id="266" r:id="rId13"/>
+    <p:sldId id="267" r:id="rId14"/>
   </p:sldIdLst>
   <p:sldSz cx="12192000" cy="6858000"/>
   <p:notesSz cx="6858000" cy="9144000"/>
@@ -111,6 +116,11 @@
       </a:defRPr>
     </a:lvl9pPr>
   </p:defaultTextStyle>
+  <p:extLst>
+    <p:ext uri="{EFAFB233-063F-42B5-8137-9DF3F51BA10A}">
+      <p15:sldGuideLst xmlns:p15="http://schemas.microsoft.com/office/powerpoint/2012/main"/>
+    </p:ext>
+  </p:extLst>
 </p:presentation>
 </file>
 
@@ -261,7 +271,7 @@
           <a:p>
             <a:fld id="{BABEF3DF-9A28-FD47-B09A-911DA9D6C31E}" type="datetimeFigureOut">
               <a:rPr lang="en-US" smtClean="0"/>
-              <a:t>4/30/21</a:t>
+              <a:t>5/1/2021</a:t>
             </a:fld>
             <a:endParaRPr lang="en-US"/>
           </a:p>
@@ -459,7 +469,7 @@
           <a:p>
             <a:fld id="{BABEF3DF-9A28-FD47-B09A-911DA9D6C31E}" type="datetimeFigureOut">
               <a:rPr lang="en-US" smtClean="0"/>
-              <a:t>4/30/21</a:t>
+              <a:t>5/1/2021</a:t>
             </a:fld>
             <a:endParaRPr lang="en-US"/>
           </a:p>
@@ -667,7 +677,7 @@
           <a:p>
             <a:fld id="{BABEF3DF-9A28-FD47-B09A-911DA9D6C31E}" type="datetimeFigureOut">
               <a:rPr lang="en-US" smtClean="0"/>
-              <a:t>4/30/21</a:t>
+              <a:t>5/1/2021</a:t>
             </a:fld>
             <a:endParaRPr lang="en-US"/>
           </a:p>
@@ -865,7 +875,7 @@
           <a:p>
             <a:fld id="{BABEF3DF-9A28-FD47-B09A-911DA9D6C31E}" type="datetimeFigureOut">
               <a:rPr lang="en-US" smtClean="0"/>
-              <a:t>4/30/21</a:t>
+              <a:t>5/1/2021</a:t>
             </a:fld>
             <a:endParaRPr lang="en-US"/>
           </a:p>
@@ -1140,7 +1150,7 @@
           <a:p>
             <a:fld id="{BABEF3DF-9A28-FD47-B09A-911DA9D6C31E}" type="datetimeFigureOut">
               <a:rPr lang="en-US" smtClean="0"/>
-              <a:t>4/30/21</a:t>
+              <a:t>5/1/2021</a:t>
             </a:fld>
             <a:endParaRPr lang="en-US"/>
           </a:p>
@@ -1405,7 +1415,7 @@
           <a:p>
             <a:fld id="{BABEF3DF-9A28-FD47-B09A-911DA9D6C31E}" type="datetimeFigureOut">
               <a:rPr lang="en-US" smtClean="0"/>
-              <a:t>4/30/21</a:t>
+              <a:t>5/1/2021</a:t>
             </a:fld>
             <a:endParaRPr lang="en-US"/>
           </a:p>
@@ -1817,7 +1827,7 @@
           <a:p>
             <a:fld id="{BABEF3DF-9A28-FD47-B09A-911DA9D6C31E}" type="datetimeFigureOut">
               <a:rPr lang="en-US" smtClean="0"/>
-              <a:t>4/30/21</a:t>
+              <a:t>5/1/2021</a:t>
             </a:fld>
             <a:endParaRPr lang="en-US"/>
           </a:p>
@@ -1958,7 +1968,7 @@
           <a:p>
             <a:fld id="{BABEF3DF-9A28-FD47-B09A-911DA9D6C31E}" type="datetimeFigureOut">
               <a:rPr lang="en-US" smtClean="0"/>
-              <a:t>4/30/21</a:t>
+              <a:t>5/1/2021</a:t>
             </a:fld>
             <a:endParaRPr lang="en-US"/>
           </a:p>
@@ -2071,7 +2081,7 @@
           <a:p>
             <a:fld id="{BABEF3DF-9A28-FD47-B09A-911DA9D6C31E}" type="datetimeFigureOut">
               <a:rPr lang="en-US" smtClean="0"/>
-              <a:t>4/30/21</a:t>
+              <a:t>5/1/2021</a:t>
             </a:fld>
             <a:endParaRPr lang="en-US"/>
           </a:p>
@@ -2382,7 +2392,7 @@
           <a:p>
             <a:fld id="{BABEF3DF-9A28-FD47-B09A-911DA9D6C31E}" type="datetimeFigureOut">
               <a:rPr lang="en-US" smtClean="0"/>
-              <a:t>4/30/21</a:t>
+              <a:t>5/1/2021</a:t>
             </a:fld>
             <a:endParaRPr lang="en-US"/>
           </a:p>
@@ -2670,7 +2680,7 @@
           <a:p>
             <a:fld id="{BABEF3DF-9A28-FD47-B09A-911DA9D6C31E}" type="datetimeFigureOut">
               <a:rPr lang="en-US" smtClean="0"/>
-              <a:t>4/30/21</a:t>
+              <a:t>5/1/2021</a:t>
             </a:fld>
             <a:endParaRPr lang="en-US"/>
           </a:p>
@@ -2911,7 +2921,7 @@
           <a:p>
             <a:fld id="{BABEF3DF-9A28-FD47-B09A-911DA9D6C31E}" type="datetimeFigureOut">
               <a:rPr lang="en-US" smtClean="0"/>
-              <a:t>4/30/21</a:t>
+              <a:t>5/1/2021</a:t>
             </a:fld>
             <a:endParaRPr lang="en-US"/>
           </a:p>
@@ -4013,6 +4023,354 @@
 </p:sld>
 </file>
 
+<file path=ppt/slides/slide10.xml><?xml version="1.0" encoding="utf-8"?>
+<p:sld xmlns:a="http://schemas.openxmlformats.org/drawingml/2006/main" xmlns:r="http://schemas.openxmlformats.org/officeDocument/2006/relationships" xmlns:p="http://schemas.openxmlformats.org/presentationml/2006/main">
+  <p:cSld>
+    <p:spTree>
+      <p:nvGrpSpPr>
+        <p:cNvPr id="1" name=""/>
+        <p:cNvGrpSpPr/>
+        <p:nvPr/>
+      </p:nvGrpSpPr>
+      <p:grpSpPr>
+        <a:xfrm>
+          <a:off x="0" y="0"/>
+          <a:ext cx="0" cy="0"/>
+          <a:chOff x="0" y="0"/>
+          <a:chExt cx="0" cy="0"/>
+        </a:xfrm>
+      </p:grpSpPr>
+      <p:sp>
+        <p:nvSpPr>
+          <p:cNvPr id="2" name="Title 1">
+            <a:extLst>
+              <a:ext uri="{FF2B5EF4-FFF2-40B4-BE49-F238E27FC236}">
+                <a16:creationId xmlns:a16="http://schemas.microsoft.com/office/drawing/2014/main" id="{8EEA1DBF-2955-47B1-9755-AC2A25A14966}"/>
+              </a:ext>
+            </a:extLst>
+          </p:cNvPr>
+          <p:cNvSpPr>
+            <a:spLocks noGrp="1"/>
+          </p:cNvSpPr>
+          <p:nvPr>
+            <p:ph type="title"/>
+          </p:nvPr>
+        </p:nvSpPr>
+        <p:spPr/>
+        <p:txBody>
+          <a:bodyPr/>
+          <a:lstStyle/>
+          <a:p>
+            <a:r>
+              <a:rPr lang="en-US" dirty="0"/>
+              <a:t>UI – Home page</a:t>
+            </a:r>
+          </a:p>
+        </p:txBody>
+      </p:sp>
+      <p:pic>
+        <p:nvPicPr>
+          <p:cNvPr id="5" name="Content Placeholder 4" descr="Graphical user interface&#10;&#10;Description automatically generated">
+            <a:extLst>
+              <a:ext uri="{FF2B5EF4-FFF2-40B4-BE49-F238E27FC236}">
+                <a16:creationId xmlns:a16="http://schemas.microsoft.com/office/drawing/2014/main" id="{A1279BCA-FA54-418A-AF9B-296C9464EFF9}"/>
+              </a:ext>
+            </a:extLst>
+          </p:cNvPr>
+          <p:cNvPicPr>
+            <a:picLocks noGrp="1" noChangeAspect="1"/>
+          </p:cNvPicPr>
+          <p:nvPr>
+            <p:ph idx="1"/>
+          </p:nvPr>
+        </p:nvPicPr>
+        <p:blipFill>
+          <a:blip r:embed="rId2"/>
+          <a:stretch>
+            <a:fillRect/>
+          </a:stretch>
+        </p:blipFill>
+        <p:spPr>
+          <a:xfrm>
+            <a:off x="1996604" y="1825625"/>
+            <a:ext cx="8198791" cy="4351338"/>
+          </a:xfrm>
+        </p:spPr>
+      </p:pic>
+    </p:spTree>
+    <p:extLst>
+      <p:ext uri="{BB962C8B-B14F-4D97-AF65-F5344CB8AC3E}">
+        <p14:creationId xmlns:p14="http://schemas.microsoft.com/office/powerpoint/2010/main" val="3064369354"/>
+      </p:ext>
+    </p:extLst>
+  </p:cSld>
+  <p:clrMapOvr>
+    <a:masterClrMapping/>
+  </p:clrMapOvr>
+</p:sld>
+</file>
+
+<file path=ppt/slides/slide11.xml><?xml version="1.0" encoding="utf-8"?>
+<p:sld xmlns:a="http://schemas.openxmlformats.org/drawingml/2006/main" xmlns:r="http://schemas.openxmlformats.org/officeDocument/2006/relationships" xmlns:p="http://schemas.openxmlformats.org/presentationml/2006/main">
+  <p:cSld>
+    <p:spTree>
+      <p:nvGrpSpPr>
+        <p:cNvPr id="1" name=""/>
+        <p:cNvGrpSpPr/>
+        <p:nvPr/>
+      </p:nvGrpSpPr>
+      <p:grpSpPr>
+        <a:xfrm>
+          <a:off x="0" y="0"/>
+          <a:ext cx="0" cy="0"/>
+          <a:chOff x="0" y="0"/>
+          <a:chExt cx="0" cy="0"/>
+        </a:xfrm>
+      </p:grpSpPr>
+      <p:sp>
+        <p:nvSpPr>
+          <p:cNvPr id="2" name="Title 1">
+            <a:extLst>
+              <a:ext uri="{FF2B5EF4-FFF2-40B4-BE49-F238E27FC236}">
+                <a16:creationId xmlns:a16="http://schemas.microsoft.com/office/drawing/2014/main" id="{7FC68995-F9B0-4E64-9400-1DC82883A6A1}"/>
+              </a:ext>
+            </a:extLst>
+          </p:cNvPr>
+          <p:cNvSpPr>
+            <a:spLocks noGrp="1"/>
+          </p:cNvSpPr>
+          <p:nvPr>
+            <p:ph type="title"/>
+          </p:nvPr>
+        </p:nvSpPr>
+        <p:spPr/>
+        <p:txBody>
+          <a:bodyPr/>
+          <a:lstStyle/>
+          <a:p>
+            <a:r>
+              <a:rPr lang="en-US" dirty="0"/>
+              <a:t>UI – Menu</a:t>
+            </a:r>
+          </a:p>
+        </p:txBody>
+      </p:sp>
+      <p:pic>
+        <p:nvPicPr>
+          <p:cNvPr id="5" name="Content Placeholder 4" descr="Graphical user interface, text, application&#10;&#10;Description automatically generated">
+            <a:extLst>
+              <a:ext uri="{FF2B5EF4-FFF2-40B4-BE49-F238E27FC236}">
+                <a16:creationId xmlns:a16="http://schemas.microsoft.com/office/drawing/2014/main" id="{2A6B46D7-F289-4FA5-B230-20B6BDBE2738}"/>
+              </a:ext>
+            </a:extLst>
+          </p:cNvPr>
+          <p:cNvPicPr>
+            <a:picLocks noGrp="1" noChangeAspect="1"/>
+          </p:cNvPicPr>
+          <p:nvPr>
+            <p:ph idx="1"/>
+          </p:nvPr>
+        </p:nvPicPr>
+        <p:blipFill>
+          <a:blip r:embed="rId2"/>
+          <a:stretch>
+            <a:fillRect/>
+          </a:stretch>
+        </p:blipFill>
+        <p:spPr>
+          <a:xfrm>
+            <a:off x="2006765" y="1825625"/>
+            <a:ext cx="8178469" cy="4351338"/>
+          </a:xfrm>
+        </p:spPr>
+      </p:pic>
+    </p:spTree>
+    <p:extLst>
+      <p:ext uri="{BB962C8B-B14F-4D97-AF65-F5344CB8AC3E}">
+        <p14:creationId xmlns:p14="http://schemas.microsoft.com/office/powerpoint/2010/main" val="3158551176"/>
+      </p:ext>
+    </p:extLst>
+  </p:cSld>
+  <p:clrMapOvr>
+    <a:masterClrMapping/>
+  </p:clrMapOvr>
+</p:sld>
+</file>
+
+<file path=ppt/slides/slide12.xml><?xml version="1.0" encoding="utf-8"?>
+<p:sld xmlns:a="http://schemas.openxmlformats.org/drawingml/2006/main" xmlns:r="http://schemas.openxmlformats.org/officeDocument/2006/relationships" xmlns:p="http://schemas.openxmlformats.org/presentationml/2006/main">
+  <p:cSld>
+    <p:spTree>
+      <p:nvGrpSpPr>
+        <p:cNvPr id="1" name=""/>
+        <p:cNvGrpSpPr/>
+        <p:nvPr/>
+      </p:nvGrpSpPr>
+      <p:grpSpPr>
+        <a:xfrm>
+          <a:off x="0" y="0"/>
+          <a:ext cx="0" cy="0"/>
+          <a:chOff x="0" y="0"/>
+          <a:chExt cx="0" cy="0"/>
+        </a:xfrm>
+      </p:grpSpPr>
+      <p:sp>
+        <p:nvSpPr>
+          <p:cNvPr id="2" name="Title 1">
+            <a:extLst>
+              <a:ext uri="{FF2B5EF4-FFF2-40B4-BE49-F238E27FC236}">
+                <a16:creationId xmlns:a16="http://schemas.microsoft.com/office/drawing/2014/main" id="{1D313705-BAE8-4C9A-B691-6AD89FAB78BB}"/>
+              </a:ext>
+            </a:extLst>
+          </p:cNvPr>
+          <p:cNvSpPr>
+            <a:spLocks noGrp="1"/>
+          </p:cNvSpPr>
+          <p:nvPr>
+            <p:ph type="title"/>
+          </p:nvPr>
+        </p:nvSpPr>
+        <p:spPr/>
+        <p:txBody>
+          <a:bodyPr/>
+          <a:lstStyle/>
+          <a:p>
+            <a:r>
+              <a:rPr lang="en-US" dirty="0"/>
+              <a:t>UI – Stats page</a:t>
+            </a:r>
+          </a:p>
+        </p:txBody>
+      </p:sp>
+      <p:pic>
+        <p:nvPicPr>
+          <p:cNvPr id="5" name="Content Placeholder 4" descr="Graphical user interface, text, application&#10;&#10;Description automatically generated">
+            <a:extLst>
+              <a:ext uri="{FF2B5EF4-FFF2-40B4-BE49-F238E27FC236}">
+                <a16:creationId xmlns:a16="http://schemas.microsoft.com/office/drawing/2014/main" id="{C77C2836-6257-494F-8DE5-49B58AD4E32E}"/>
+              </a:ext>
+            </a:extLst>
+          </p:cNvPr>
+          <p:cNvPicPr>
+            <a:picLocks noGrp="1" noChangeAspect="1"/>
+          </p:cNvPicPr>
+          <p:nvPr>
+            <p:ph idx="1"/>
+          </p:nvPr>
+        </p:nvPicPr>
+        <p:blipFill>
+          <a:blip r:embed="rId2"/>
+          <a:stretch>
+            <a:fillRect/>
+          </a:stretch>
+        </p:blipFill>
+        <p:spPr>
+          <a:xfrm>
+            <a:off x="2000623" y="1825625"/>
+            <a:ext cx="8190754" cy="4351338"/>
+          </a:xfrm>
+        </p:spPr>
+      </p:pic>
+    </p:spTree>
+    <p:extLst>
+      <p:ext uri="{BB962C8B-B14F-4D97-AF65-F5344CB8AC3E}">
+        <p14:creationId xmlns:p14="http://schemas.microsoft.com/office/powerpoint/2010/main" val="1178058308"/>
+      </p:ext>
+    </p:extLst>
+  </p:cSld>
+  <p:clrMapOvr>
+    <a:masterClrMapping/>
+  </p:clrMapOvr>
+</p:sld>
+</file>
+
+<file path=ppt/slides/slide13.xml><?xml version="1.0" encoding="utf-8"?>
+<p:sld xmlns:a="http://schemas.openxmlformats.org/drawingml/2006/main" xmlns:r="http://schemas.openxmlformats.org/officeDocument/2006/relationships" xmlns:p="http://schemas.openxmlformats.org/presentationml/2006/main">
+  <p:cSld>
+    <p:spTree>
+      <p:nvGrpSpPr>
+        <p:cNvPr id="1" name=""/>
+        <p:cNvGrpSpPr/>
+        <p:nvPr/>
+      </p:nvGrpSpPr>
+      <p:grpSpPr>
+        <a:xfrm>
+          <a:off x="0" y="0"/>
+          <a:ext cx="0" cy="0"/>
+          <a:chOff x="0" y="0"/>
+          <a:chExt cx="0" cy="0"/>
+        </a:xfrm>
+      </p:grpSpPr>
+      <p:sp>
+        <p:nvSpPr>
+          <p:cNvPr id="2" name="Title 1">
+            <a:extLst>
+              <a:ext uri="{FF2B5EF4-FFF2-40B4-BE49-F238E27FC236}">
+                <a16:creationId xmlns:a16="http://schemas.microsoft.com/office/drawing/2014/main" id="{1923C4C4-C0A6-4E59-BA2E-5DE6876E3B39}"/>
+              </a:ext>
+            </a:extLst>
+          </p:cNvPr>
+          <p:cNvSpPr>
+            <a:spLocks noGrp="1"/>
+          </p:cNvSpPr>
+          <p:nvPr>
+            <p:ph type="title"/>
+          </p:nvPr>
+        </p:nvSpPr>
+        <p:spPr/>
+        <p:txBody>
+          <a:bodyPr/>
+          <a:lstStyle/>
+          <a:p>
+            <a:r>
+              <a:rPr lang="en-US" dirty="0"/>
+              <a:t>UI – Findings page</a:t>
+            </a:r>
+          </a:p>
+        </p:txBody>
+      </p:sp>
+      <p:pic>
+        <p:nvPicPr>
+          <p:cNvPr id="5" name="Content Placeholder 4" descr="Graphical user interface, text, application&#10;&#10;Description automatically generated">
+            <a:extLst>
+              <a:ext uri="{FF2B5EF4-FFF2-40B4-BE49-F238E27FC236}">
+                <a16:creationId xmlns:a16="http://schemas.microsoft.com/office/drawing/2014/main" id="{E569A64C-C447-4D2A-82C2-7A34554FA11E}"/>
+              </a:ext>
+            </a:extLst>
+          </p:cNvPr>
+          <p:cNvPicPr>
+            <a:picLocks noGrp="1" noChangeAspect="1"/>
+          </p:cNvPicPr>
+          <p:nvPr>
+            <p:ph idx="1"/>
+          </p:nvPr>
+        </p:nvPicPr>
+        <p:blipFill>
+          <a:blip r:embed="rId2"/>
+          <a:stretch>
+            <a:fillRect/>
+          </a:stretch>
+        </p:blipFill>
+        <p:spPr>
+          <a:xfrm>
+            <a:off x="1992577" y="1825625"/>
+            <a:ext cx="8206846" cy="4351338"/>
+          </a:xfrm>
+        </p:spPr>
+      </p:pic>
+    </p:spTree>
+    <p:extLst>
+      <p:ext uri="{BB962C8B-B14F-4D97-AF65-F5344CB8AC3E}">
+        <p14:creationId xmlns:p14="http://schemas.microsoft.com/office/powerpoint/2010/main" val="1422245529"/>
+      </p:ext>
+    </p:extLst>
+  </p:cSld>
+  <p:clrMapOvr>
+    <a:masterClrMapping/>
+  </p:clrMapOvr>
+</p:sld>
+</file>
+
 <file path=ppt/slides/slide2.xml><?xml version="1.0" encoding="utf-8"?>
 <p:sld xmlns:a="http://schemas.openxmlformats.org/drawingml/2006/main" xmlns:r="http://schemas.openxmlformats.org/officeDocument/2006/relationships" xmlns:p="http://schemas.openxmlformats.org/presentationml/2006/main">
   <p:cSld>
@@ -4626,6 +4984,125 @@
     <p:extLst>
       <p:ext uri="{BB962C8B-B14F-4D97-AF65-F5344CB8AC3E}">
         <p14:creationId xmlns:p14="http://schemas.microsoft.com/office/powerpoint/2010/main" val="145470210"/>
+      </p:ext>
+    </p:extLst>
+  </p:cSld>
+  <p:clrMapOvr>
+    <a:masterClrMapping/>
+  </p:clrMapOvr>
+</p:sld>
+</file>
+
+<file path=ppt/slides/slide9.xml><?xml version="1.0" encoding="utf-8"?>
+<p:sld xmlns:a="http://schemas.openxmlformats.org/drawingml/2006/main" xmlns:r="http://schemas.openxmlformats.org/officeDocument/2006/relationships" xmlns:p="http://schemas.openxmlformats.org/presentationml/2006/main">
+  <p:cSld>
+    <p:spTree>
+      <p:nvGrpSpPr>
+        <p:cNvPr id="1" name=""/>
+        <p:cNvGrpSpPr/>
+        <p:nvPr/>
+      </p:nvGrpSpPr>
+      <p:grpSpPr>
+        <a:xfrm>
+          <a:off x="0" y="0"/>
+          <a:ext cx="0" cy="0"/>
+          <a:chOff x="0" y="0"/>
+          <a:chExt cx="0" cy="0"/>
+        </a:xfrm>
+      </p:grpSpPr>
+      <p:sp>
+        <p:nvSpPr>
+          <p:cNvPr id="2" name="Title 1">
+            <a:extLst>
+              <a:ext uri="{FF2B5EF4-FFF2-40B4-BE49-F238E27FC236}">
+                <a16:creationId xmlns:a16="http://schemas.microsoft.com/office/drawing/2014/main" id="{A86BCDD1-209F-4A0C-9C90-D2D25C820170}"/>
+              </a:ext>
+            </a:extLst>
+          </p:cNvPr>
+          <p:cNvSpPr>
+            <a:spLocks noGrp="1"/>
+          </p:cNvSpPr>
+          <p:nvPr>
+            <p:ph type="title"/>
+          </p:nvPr>
+        </p:nvSpPr>
+        <p:spPr/>
+        <p:txBody>
+          <a:bodyPr/>
+          <a:lstStyle/>
+          <a:p>
+            <a:r>
+              <a:rPr lang="en-US" dirty="0"/>
+              <a:t>UI</a:t>
+            </a:r>
+          </a:p>
+        </p:txBody>
+      </p:sp>
+      <p:sp>
+        <p:nvSpPr>
+          <p:cNvPr id="3" name="Content Placeholder 2">
+            <a:extLst>
+              <a:ext uri="{FF2B5EF4-FFF2-40B4-BE49-F238E27FC236}">
+                <a16:creationId xmlns:a16="http://schemas.microsoft.com/office/drawing/2014/main" id="{36C856F0-9F07-4373-8F67-80B33733DC90}"/>
+              </a:ext>
+            </a:extLst>
+          </p:cNvPr>
+          <p:cNvSpPr>
+            <a:spLocks noGrp="1"/>
+          </p:cNvSpPr>
+          <p:nvPr>
+            <p:ph idx="1"/>
+          </p:nvPr>
+        </p:nvSpPr>
+        <p:spPr/>
+        <p:txBody>
+          <a:bodyPr/>
+          <a:lstStyle/>
+          <a:p>
+            <a:r>
+              <a:rPr lang="en-US" dirty="0"/>
+              <a:t>UI was created separately on Windows 10 with the latest version of Flutter (</a:t>
+            </a:r>
+            <a:r>
+              <a:rPr lang="en-US" dirty="0">
+                <a:hlinkClick r:id="rId2"/>
+              </a:rPr>
+              <a:t>https://flutter.dev/</a:t>
+            </a:r>
+            <a:r>
+              <a:rPr lang="en-US" dirty="0"/>
+              <a:t>).</a:t>
+            </a:r>
+          </a:p>
+          <a:p>
+            <a:r>
+              <a:rPr lang="en-US" dirty="0"/>
+              <a:t>Plan was to provide an interface to better display statistics and findings of the scans/pictures. </a:t>
+            </a:r>
+          </a:p>
+          <a:p>
+            <a:r>
+              <a:rPr lang="en-US" dirty="0"/>
+              <a:t>Another planned feature was to allow the download of these as well.</a:t>
+            </a:r>
+          </a:p>
+          <a:p>
+            <a:r>
+              <a:rPr lang="en-US" dirty="0"/>
+              <a:t>Home page was meant to show a view of a camera and detect objects from there so they can be processed/coordinated with OpenCV </a:t>
+            </a:r>
+            <a:r>
+              <a:rPr lang="en-US"/>
+              <a:t>and model.</a:t>
+            </a:r>
+            <a:endParaRPr lang="en-US" dirty="0"/>
+          </a:p>
+        </p:txBody>
+      </p:sp>
+    </p:spTree>
+    <p:extLst>
+      <p:ext uri="{BB962C8B-B14F-4D97-AF65-F5344CB8AC3E}">
+        <p14:creationId xmlns:p14="http://schemas.microsoft.com/office/powerpoint/2010/main" val="1340263466"/>
       </p:ext>
     </p:extLst>
   </p:cSld>

</xml_diff>